<commit_message>
Change Slide Development in Presentation
</commit_message>
<xml_diff>
--- a/01. Documentations/02. Project Docs/Presentation/Project_Report_Group1.pptx
+++ b/01. Documentations/02. Project Docs/Presentation/Project_Report_Group1.pptx
@@ -206,12 +206,61 @@
 <p1510:revInfo xmlns:a="http://schemas.openxmlformats.org/drawingml/2006/main" xmlns:r="http://schemas.openxmlformats.org/officeDocument/2006/relationships" xmlns:p1510="http://schemas.microsoft.com/office/powerpoint/2015/10/main">
   <p1510:revLst>
     <p1510:client id="{169EA6E5-5EDB-4470-87F3-C14F8C8706E4}" v="102" dt="2024-01-09T04:24:46.298"/>
+    <p1510:client id="{450A0231-F4A4-4A93-A390-B72110305AF2}" v="1" dt="2024-01-09T05:34:56.856"/>
   </p1510:revLst>
 </p1510:revInfo>
 </file>
 
 <file path=ppt/changesInfos/changesInfo1.xml><?xml version="1.0" encoding="utf-8"?>
 <pc:chgInfo xmlns:a="http://schemas.openxmlformats.org/drawingml/2006/main" xmlns:r="http://schemas.openxmlformats.org/officeDocument/2006/relationships" xmlns:ac="http://schemas.microsoft.com/office/drawing/2013/main/command" xmlns:pc="http://schemas.microsoft.com/office/powerpoint/2013/main/command">
+  <pc:docChgLst>
+    <pc:chgData name="Administrator" userId="3a4c4559-915b-432e-8a1e-73a9a4a1a23e" providerId="ADAL" clId="{450A0231-F4A4-4A93-A390-B72110305AF2}"/>
+    <pc:docChg chg="undo custSel modSld">
+      <pc:chgData name="Administrator" userId="3a4c4559-915b-432e-8a1e-73a9a4a1a23e" providerId="ADAL" clId="{450A0231-F4A4-4A93-A390-B72110305AF2}" dt="2024-01-09T05:35:32.114" v="9" actId="1076"/>
+      <pc:docMkLst>
+        <pc:docMk/>
+      </pc:docMkLst>
+      <pc:sldChg chg="addSp delSp modSp mod">
+        <pc:chgData name="Administrator" userId="3a4c4559-915b-432e-8a1e-73a9a4a1a23e" providerId="ADAL" clId="{450A0231-F4A4-4A93-A390-B72110305AF2}" dt="2024-01-09T05:35:32.114" v="9" actId="1076"/>
+        <pc:sldMkLst>
+          <pc:docMk/>
+          <pc:sldMk cId="1751298595" sldId="397"/>
+        </pc:sldMkLst>
+        <pc:spChg chg="add del mod">
+          <ac:chgData name="Administrator" userId="3a4c4559-915b-432e-8a1e-73a9a4a1a23e" providerId="ADAL" clId="{450A0231-F4A4-4A93-A390-B72110305AF2}" dt="2024-01-09T05:35:14.033" v="4" actId="478"/>
+          <ac:spMkLst>
+            <pc:docMk/>
+            <pc:sldMk cId="1751298595" sldId="397"/>
+            <ac:spMk id="6" creationId="{28C456FE-3377-E812-F676-77EEB3078D8A}"/>
+          </ac:spMkLst>
+        </pc:spChg>
+        <pc:spChg chg="add del mod">
+          <ac:chgData name="Administrator" userId="3a4c4559-915b-432e-8a1e-73a9a4a1a23e" providerId="ADAL" clId="{450A0231-F4A4-4A93-A390-B72110305AF2}" dt="2024-01-09T05:35:19.192" v="6" actId="478"/>
+          <ac:spMkLst>
+            <pc:docMk/>
+            <pc:sldMk cId="1751298595" sldId="397"/>
+            <ac:spMk id="9" creationId="{6B01264E-5B33-9D1A-9E5A-C347301C0E38}"/>
+          </ac:spMkLst>
+        </pc:spChg>
+        <pc:picChg chg="add del">
+          <ac:chgData name="Administrator" userId="3a4c4559-915b-432e-8a1e-73a9a4a1a23e" providerId="ADAL" clId="{450A0231-F4A4-4A93-A390-B72110305AF2}" dt="2024-01-09T05:35:16.491" v="5" actId="478"/>
+          <ac:picMkLst>
+            <pc:docMk/>
+            <pc:sldMk cId="1751298595" sldId="397"/>
+            <ac:picMk id="2" creationId="{586FA143-27E1-9515-0E36-9A4C933106F1}"/>
+          </ac:picMkLst>
+        </pc:picChg>
+        <pc:picChg chg="add mod">
+          <ac:chgData name="Administrator" userId="3a4c4559-915b-432e-8a1e-73a9a4a1a23e" providerId="ADAL" clId="{450A0231-F4A4-4A93-A390-B72110305AF2}" dt="2024-01-09T05:35:32.114" v="9" actId="1076"/>
+          <ac:picMkLst>
+            <pc:docMk/>
+            <pc:sldMk cId="1751298595" sldId="397"/>
+            <ac:picMk id="3" creationId="{34A95FDC-060C-3D19-C359-344C8573B8D4}"/>
+          </ac:picMkLst>
+        </pc:picChg>
+      </pc:sldChg>
+    </pc:docChg>
+  </pc:docChgLst>
   <pc:docChgLst>
     <pc:chgData name="Administrator" userId="3a4c4559-915b-432e-8a1e-73a9a4a1a23e" providerId="ADAL" clId="{169EA6E5-5EDB-4470-87F3-C14F8C8706E4}"/>
     <pc:docChg chg="undo redo custSel modSld">
@@ -16170,22 +16219,20 @@
       </p:sp>
       <p:pic>
         <p:nvPicPr>
-          <p:cNvPr id="2" name="Content Placeholder 1">
+          <p:cNvPr id="3" name="Picture 2">
             <a:extLst>
               <a:ext uri="{FF2B5EF4-FFF2-40B4-BE49-F238E27FC236}">
-                <a16:creationId xmlns:a16="http://schemas.microsoft.com/office/drawing/2014/main" id="{586FA143-27E1-9515-0E36-9A4C933106F1}"/>
+                <a16:creationId xmlns:a16="http://schemas.microsoft.com/office/drawing/2014/main" id="{34A95FDC-060C-3D19-C359-344C8573B8D4}"/>
               </a:ext>
             </a:extLst>
           </p:cNvPr>
           <p:cNvPicPr>
-            <a:picLocks noGrp="1" noChangeAspect="1"/>
+            <a:picLocks noChangeAspect="1"/>
           </p:cNvPicPr>
-          <p:nvPr>
-            <p:ph idx="1"/>
-          </p:nvPr>
+          <p:nvPr/>
         </p:nvPicPr>
         <p:blipFill>
-          <a:blip r:embed="rId2" cstate="print">
+          <a:blip r:embed="rId2">
             <a:extLst>
               <a:ext uri="{28A0092B-C50C-407E-A947-70E740481C1C}">
                 <a14:useLocalDpi xmlns:a14="http://schemas.microsoft.com/office/drawing/2010/main" val="0"/>
@@ -16198,8 +16245,8 @@
         </p:blipFill>
         <p:spPr>
           <a:xfrm>
-            <a:off x="533400" y="793146"/>
-            <a:ext cx="8425478" cy="5683854"/>
+            <a:off x="181465" y="1066800"/>
+            <a:ext cx="8936492" cy="3784917"/>
           </a:xfrm>
           <a:prstGeom prst="rect">
             <a:avLst/>

</xml_diff>